<commit_message>
more post session fixes
</commit_message>
<xml_diff>
--- a/docs/slides/S3_General_Intro.pptx
+++ b/docs/slides/S3_General_Intro.pptx
@@ -6,7 +6,7 @@
     <p:sldMasterId id="2147483671" r:id="rId2"/>
   </p:sldMasterIdLst>
   <p:notesMasterIdLst>
-    <p:notesMasterId r:id="rId15"/>
+    <p:notesMasterId r:id="rId14"/>
   </p:notesMasterIdLst>
   <p:sldIdLst>
     <p:sldId id="256" r:id="rId3"/>
@@ -20,7 +20,6 @@
     <p:sldId id="351" r:id="rId11"/>
     <p:sldId id="352" r:id="rId12"/>
     <p:sldId id="413" r:id="rId13"/>
-    <p:sldId id="353" r:id="rId14"/>
   </p:sldIdLst>
   <p:sldSz cx="12192000" cy="6858000"/>
   <p:notesSz cx="6858000" cy="9144000"/>
@@ -135,7 +134,6 @@
             <p14:sldId id="351"/>
             <p14:sldId id="352"/>
             <p14:sldId id="413"/>
-            <p14:sldId id="353"/>
           </p14:sldIdLst>
         </p14:section>
       </p14:sectionLst>
@@ -162,52 +160,101 @@
 <file path=ppt/changesInfos/changesInfo1.xml><?xml version="1.0" encoding="utf-8"?>
 <pc:chgInfo xmlns:a="http://schemas.openxmlformats.org/drawingml/2006/main" xmlns:r="http://schemas.openxmlformats.org/officeDocument/2006/relationships" xmlns:ac="http://schemas.microsoft.com/office/drawing/2013/main/command" xmlns:pc="http://schemas.microsoft.com/office/powerpoint/2013/main/command">
   <pc:docChgLst>
-    <pc:chgData name="Liam Hill" userId="cf4eacb2-5eb2-4c8d-8100-2f2500eca56b" providerId="ADAL" clId="{89C2D966-D689-408B-8FF1-D58E751DB0F9}"/>
+    <pc:chgData name="Liam Hill" userId="cf4eacb2-5eb2-4c8d-8100-2f2500eca56b" providerId="ADAL" clId="{A08C5B63-297E-4833-9037-A856AABE64B4}"/>
     <pc:docChg chg="delSld delSection modSection">
-      <pc:chgData name="Liam Hill" userId="cf4eacb2-5eb2-4c8d-8100-2f2500eca56b" providerId="ADAL" clId="{89C2D966-D689-408B-8FF1-D58E751DB0F9}" dt="2025-06-12T15:49:32.858" v="3" actId="17851"/>
+      <pc:chgData name="Liam Hill" userId="cf4eacb2-5eb2-4c8d-8100-2f2500eca56b" providerId="ADAL" clId="{A08C5B63-297E-4833-9037-A856AABE64B4}" dt="2025-06-13T16:13:30.546" v="4" actId="17851"/>
       <pc:docMkLst>
         <pc:docMk/>
       </pc:docMkLst>
       <pc:sldChg chg="del">
-        <pc:chgData name="Liam Hill" userId="cf4eacb2-5eb2-4c8d-8100-2f2500eca56b" providerId="ADAL" clId="{89C2D966-D689-408B-8FF1-D58E751DB0F9}" dt="2025-06-12T15:49:22.564" v="0" actId="47"/>
+        <pc:chgData name="Liam Hill" userId="cf4eacb2-5eb2-4c8d-8100-2f2500eca56b" providerId="ADAL" clId="{A08C5B63-297E-4833-9037-A856AABE64B4}" dt="2025-06-13T16:13:10.430" v="0" actId="47"/>
+        <pc:sldMkLst>
+          <pc:docMk/>
+          <pc:sldMk cId="3534245109" sldId="285"/>
+        </pc:sldMkLst>
+      </pc:sldChg>
+      <pc:sldChg chg="del">
+        <pc:chgData name="Liam Hill" userId="cf4eacb2-5eb2-4c8d-8100-2f2500eca56b" providerId="ADAL" clId="{A08C5B63-297E-4833-9037-A856AABE64B4}" dt="2025-06-13T16:13:10.430" v="0" actId="47"/>
         <pc:sldMkLst>
           <pc:docMk/>
           <pc:sldMk cId="4270276616" sldId="331"/>
         </pc:sldMkLst>
       </pc:sldChg>
       <pc:sldChg chg="del">
-        <pc:chgData name="Liam Hill" userId="cf4eacb2-5eb2-4c8d-8100-2f2500eca56b" providerId="ADAL" clId="{89C2D966-D689-408B-8FF1-D58E751DB0F9}" dt="2025-06-12T15:49:22.564" v="0" actId="47"/>
+        <pc:chgData name="Liam Hill" userId="cf4eacb2-5eb2-4c8d-8100-2f2500eca56b" providerId="ADAL" clId="{A08C5B63-297E-4833-9037-A856AABE64B4}" dt="2025-06-13T16:13:10.430" v="0" actId="47"/>
         <pc:sldMkLst>
           <pc:docMk/>
           <pc:sldMk cId="2425737240" sldId="384"/>
         </pc:sldMkLst>
       </pc:sldChg>
       <pc:sldChg chg="del">
-        <pc:chgData name="Liam Hill" userId="cf4eacb2-5eb2-4c8d-8100-2f2500eca56b" providerId="ADAL" clId="{89C2D966-D689-408B-8FF1-D58E751DB0F9}" dt="2025-06-12T15:49:22.564" v="0" actId="47"/>
+        <pc:chgData name="Liam Hill" userId="cf4eacb2-5eb2-4c8d-8100-2f2500eca56b" providerId="ADAL" clId="{A08C5B63-297E-4833-9037-A856AABE64B4}" dt="2025-06-13T16:13:10.430" v="0" actId="47"/>
         <pc:sldMkLst>
           <pc:docMk/>
           <pc:sldMk cId="2867310330" sldId="386"/>
         </pc:sldMkLst>
       </pc:sldChg>
       <pc:sldChg chg="del">
-        <pc:chgData name="Liam Hill" userId="cf4eacb2-5eb2-4c8d-8100-2f2500eca56b" providerId="ADAL" clId="{89C2D966-D689-408B-8FF1-D58E751DB0F9}" dt="2025-06-12T15:49:22.564" v="0" actId="47"/>
+        <pc:chgData name="Liam Hill" userId="cf4eacb2-5eb2-4c8d-8100-2f2500eca56b" providerId="ADAL" clId="{A08C5B63-297E-4833-9037-A856AABE64B4}" dt="2025-06-13T16:13:10.430" v="0" actId="47"/>
         <pc:sldMkLst>
           <pc:docMk/>
           <pc:sldMk cId="3941781229" sldId="409"/>
         </pc:sldMkLst>
       </pc:sldChg>
       <pc:sldChg chg="del">
-        <pc:chgData name="Liam Hill" userId="cf4eacb2-5eb2-4c8d-8100-2f2500eca56b" providerId="ADAL" clId="{89C2D966-D689-408B-8FF1-D58E751DB0F9}" dt="2025-06-12T15:49:22.564" v="0" actId="47"/>
+        <pc:chgData name="Liam Hill" userId="cf4eacb2-5eb2-4c8d-8100-2f2500eca56b" providerId="ADAL" clId="{A08C5B63-297E-4833-9037-A856AABE64B4}" dt="2025-06-13T16:13:10.430" v="0" actId="47"/>
         <pc:sldMkLst>
           <pc:docMk/>
           <pc:sldMk cId="3825032302" sldId="410"/>
         </pc:sldMkLst>
       </pc:sldChg>
       <pc:sldChg chg="del">
-        <pc:chgData name="Liam Hill" userId="cf4eacb2-5eb2-4c8d-8100-2f2500eca56b" providerId="ADAL" clId="{89C2D966-D689-408B-8FF1-D58E751DB0F9}" dt="2025-06-12T15:49:22.564" v="0" actId="47"/>
+        <pc:chgData name="Liam Hill" userId="cf4eacb2-5eb2-4c8d-8100-2f2500eca56b" providerId="ADAL" clId="{A08C5B63-297E-4833-9037-A856AABE64B4}" dt="2025-06-13T16:13:10.430" v="0" actId="47"/>
         <pc:sldMkLst>
           <pc:docMk/>
-          <pc:sldMk cId="116950389" sldId="411"/>
+          <pc:sldMk cId="3754412307" sldId="414"/>
+        </pc:sldMkLst>
+      </pc:sldChg>
+      <pc:sldChg chg="del">
+        <pc:chgData name="Liam Hill" userId="cf4eacb2-5eb2-4c8d-8100-2f2500eca56b" providerId="ADAL" clId="{A08C5B63-297E-4833-9037-A856AABE64B4}" dt="2025-06-13T16:13:10.430" v="0" actId="47"/>
+        <pc:sldMkLst>
+          <pc:docMk/>
+          <pc:sldMk cId="2057896183" sldId="454"/>
+        </pc:sldMkLst>
+      </pc:sldChg>
+      <pc:sldChg chg="del">
+        <pc:chgData name="Liam Hill" userId="cf4eacb2-5eb2-4c8d-8100-2f2500eca56b" providerId="ADAL" clId="{A08C5B63-297E-4833-9037-A856AABE64B4}" dt="2025-06-13T16:13:10.430" v="0" actId="47"/>
+        <pc:sldMkLst>
+          <pc:docMk/>
+          <pc:sldMk cId="3622454126" sldId="455"/>
+        </pc:sldMkLst>
+      </pc:sldChg>
+      <pc:sldChg chg="del">
+        <pc:chgData name="Liam Hill" userId="cf4eacb2-5eb2-4c8d-8100-2f2500eca56b" providerId="ADAL" clId="{A08C5B63-297E-4833-9037-A856AABE64B4}" dt="2025-06-13T16:13:10.430" v="0" actId="47"/>
+        <pc:sldMkLst>
+          <pc:docMk/>
+          <pc:sldMk cId="2697903982" sldId="456"/>
+        </pc:sldMkLst>
+      </pc:sldChg>
+      <pc:sldChg chg="del">
+        <pc:chgData name="Liam Hill" userId="cf4eacb2-5eb2-4c8d-8100-2f2500eca56b" providerId="ADAL" clId="{A08C5B63-297E-4833-9037-A856AABE64B4}" dt="2025-06-13T16:13:10.430" v="0" actId="47"/>
+        <pc:sldMkLst>
+          <pc:docMk/>
+          <pc:sldMk cId="3919216018" sldId="458"/>
+        </pc:sldMkLst>
+      </pc:sldChg>
+      <pc:sldChg chg="del">
+        <pc:chgData name="Liam Hill" userId="cf4eacb2-5eb2-4c8d-8100-2f2500eca56b" providerId="ADAL" clId="{A08C5B63-297E-4833-9037-A856AABE64B4}" dt="2025-06-13T16:13:10.430" v="0" actId="47"/>
+        <pc:sldMkLst>
+          <pc:docMk/>
+          <pc:sldMk cId="1131995699" sldId="459"/>
+        </pc:sldMkLst>
+      </pc:sldChg>
+      <pc:sldChg chg="del">
+        <pc:chgData name="Liam Hill" userId="cf4eacb2-5eb2-4c8d-8100-2f2500eca56b" providerId="ADAL" clId="{A08C5B63-297E-4833-9037-A856AABE64B4}" dt="2025-06-13T16:13:10.430" v="0" actId="47"/>
+        <pc:sldMkLst>
+          <pc:docMk/>
+          <pc:sldMk cId="2738866352" sldId="460"/>
         </pc:sldMkLst>
       </pc:sldChg>
     </pc:docChg>
@@ -297,7 +344,7 @@
           <a:p>
             <a:fld id="{470085E8-8BAE-40DA-B036-0B44F60AADE1}" type="datetimeFigureOut">
               <a:rPr lang="en-US"/>
-              <a:t>6/12/2025</a:t>
+              <a:t>6/13/2025</a:t>
             </a:fld>
             <a:endParaRPr lang="en-US"/>
           </a:p>
@@ -1333,150 +1380,6 @@
 </p:notes>
 </file>
 
-<file path=ppt/notesSlides/notesSlide6.xml><?xml version="1.0" encoding="utf-8"?>
-<p:notes xmlns:a="http://schemas.openxmlformats.org/drawingml/2006/main" xmlns:r="http://schemas.openxmlformats.org/officeDocument/2006/relationships" xmlns:p="http://schemas.openxmlformats.org/presentationml/2006/main">
-  <p:cSld>
-    <p:spTree>
-      <p:nvGrpSpPr>
-        <p:cNvPr id="1" name=""/>
-        <p:cNvGrpSpPr/>
-        <p:nvPr/>
-      </p:nvGrpSpPr>
-      <p:grpSpPr>
-        <a:xfrm>
-          <a:off x="0" y="0"/>
-          <a:ext cx="0" cy="0"/>
-          <a:chOff x="0" y="0"/>
-          <a:chExt cx="0" cy="0"/>
-        </a:xfrm>
-      </p:grpSpPr>
-      <p:sp>
-        <p:nvSpPr>
-          <p:cNvPr id="2" name="Slide Image Placeholder 1"/>
-          <p:cNvSpPr>
-            <a:spLocks noGrp="1" noRot="1" noChangeAspect="1"/>
-          </p:cNvSpPr>
-          <p:nvPr>
-            <p:ph type="sldImg"/>
-          </p:nvPr>
-        </p:nvSpPr>
-        <p:spPr/>
-      </p:sp>
-      <p:sp>
-        <p:nvSpPr>
-          <p:cNvPr id="3" name="Notes Placeholder 2"/>
-          <p:cNvSpPr>
-            <a:spLocks noGrp="1"/>
-          </p:cNvSpPr>
-          <p:nvPr>
-            <p:ph type="body" idx="1"/>
-          </p:nvPr>
-        </p:nvSpPr>
-        <p:spPr/>
-        <p:txBody>
-          <a:bodyPr/>
-          <a:lstStyle/>
-          <a:p>
-            <a:endParaRPr lang="en-GB" dirty="0"/>
-          </a:p>
-        </p:txBody>
-      </p:sp>
-      <p:sp>
-        <p:nvSpPr>
-          <p:cNvPr id="4" name="Slide Number Placeholder 3"/>
-          <p:cNvSpPr>
-            <a:spLocks noGrp="1"/>
-          </p:cNvSpPr>
-          <p:nvPr>
-            <p:ph type="sldNum" sz="quarter" idx="5"/>
-          </p:nvPr>
-        </p:nvSpPr>
-        <p:spPr/>
-        <p:txBody>
-          <a:bodyPr/>
-          <a:lstStyle/>
-          <a:p>
-            <a:pPr marL="0" marR="0" lvl="0" indent="0" algn="r" defTabSz="457200" rtl="0" eaLnBrk="1" fontAlgn="auto" latinLnBrk="0" hangingPunct="1">
-              <a:lnSpc>
-                <a:spcPct val="100000"/>
-              </a:lnSpc>
-              <a:spcBef>
-                <a:spcPts val="0"/>
-              </a:spcBef>
-              <a:spcAft>
-                <a:spcPts val="0"/>
-              </a:spcAft>
-              <a:buClrTx/>
-              <a:buSzTx/>
-              <a:buFontTx/>
-              <a:buNone/>
-              <a:tabLst/>
-              <a:defRPr/>
-            </a:pPr>
-            <a:fld id="{9B153718-415C-41B9-8FF4-AD57B58B5838}" type="slidenum">
-              <a:rPr kumimoji="0" lang="en-US" sz="1200" b="0" i="0" u="none" strike="noStrike" kern="1200" cap="none" spc="0" normalizeH="0" baseline="0" noProof="0" smtClean="0">
-                <a:ln>
-                  <a:noFill/>
-                </a:ln>
-                <a:solidFill>
-                  <a:prstClr val="black"/>
-                </a:solidFill>
-                <a:effectLst/>
-                <a:uLnTx/>
-                <a:uFillTx/>
-                <a:latin typeface="Calibri" panose="020F0502020204030204"/>
-                <a:ea typeface="+mn-ea"/>
-                <a:cs typeface="+mn-cs"/>
-              </a:rPr>
-              <a:pPr marL="0" marR="0" lvl="0" indent="0" algn="r" defTabSz="457200" rtl="0" eaLnBrk="1" fontAlgn="auto" latinLnBrk="0" hangingPunct="1">
-                <a:lnSpc>
-                  <a:spcPct val="100000"/>
-                </a:lnSpc>
-                <a:spcBef>
-                  <a:spcPts val="0"/>
-                </a:spcBef>
-                <a:spcAft>
-                  <a:spcPts val="0"/>
-                </a:spcAft>
-                <a:buClrTx/>
-                <a:buSzTx/>
-                <a:buFontTx/>
-                <a:buNone/>
-                <a:tabLst/>
-                <a:defRPr/>
-              </a:pPr>
-              <a:t>12</a:t>
-            </a:fld>
-            <a:endParaRPr kumimoji="0" lang="en-US" sz="1200" b="0" i="0" u="none" strike="noStrike" kern="1200" cap="none" spc="0" normalizeH="0" baseline="0" noProof="0">
-              <a:ln>
-                <a:noFill/>
-              </a:ln>
-              <a:solidFill>
-                <a:prstClr val="black"/>
-              </a:solidFill>
-              <a:effectLst/>
-              <a:uLnTx/>
-              <a:uFillTx/>
-              <a:latin typeface="Calibri" panose="020F0502020204030204"/>
-              <a:ea typeface="+mn-ea"/>
-              <a:cs typeface="+mn-cs"/>
-            </a:endParaRPr>
-          </a:p>
-        </p:txBody>
-      </p:sp>
-    </p:spTree>
-    <p:extLst>
-      <p:ext uri="{BB962C8B-B14F-4D97-AF65-F5344CB8AC3E}">
-        <p14:creationId xmlns:p14="http://schemas.microsoft.com/office/powerpoint/2010/main" val="35459900"/>
-      </p:ext>
-    </p:extLst>
-  </p:cSld>
-  <p:clrMapOvr>
-    <a:masterClrMapping/>
-  </p:clrMapOvr>
-</p:notes>
-</file>
-
 <file path=ppt/slideLayouts/slideLayout1.xml><?xml version="1.0" encoding="utf-8"?>
 <p:sldLayout xmlns:a="http://schemas.openxmlformats.org/drawingml/2006/main" xmlns:r="http://schemas.openxmlformats.org/officeDocument/2006/relationships" xmlns:p="http://schemas.openxmlformats.org/presentationml/2006/main" showMasterSp="0" type="title" preserve="1">
   <p:cSld name="Title Slide">
@@ -1933,7 +1836,7 @@
             <a:fld id="{1E700B27-DE4C-4B9E-BB11-B9027034A00F}" type="datetimeFigureOut">
               <a:rPr lang="en-US" dirty="0"/>
               <a:pPr/>
-              <a:t>6/12/2025</a:t>
+              <a:t>6/13/2025</a:t>
             </a:fld>
             <a:endParaRPr lang="en-US"/>
           </a:p>
@@ -3051,7 +2954,7 @@
           <a:p>
             <a:fld id="{C40F4739-9812-4A9F-890D-2AD6BA5F6EE8}" type="datetimeFigureOut">
               <a:rPr lang="en-US" dirty="0"/>
-              <a:t>6/12/2025</a:t>
+              <a:t>6/13/2025</a:t>
             </a:fld>
             <a:endParaRPr lang="en-US"/>
           </a:p>
@@ -3998,7 +3901,7 @@
           <a:p>
             <a:fld id="{18845AC5-A3F8-44AA-BA8F-596CDCC976D3}" type="datetimeFigureOut">
               <a:rPr lang="en-US" dirty="0"/>
-              <a:t>6/12/2025</a:t>
+              <a:t>6/13/2025</a:t>
             </a:fld>
             <a:endParaRPr lang="en-US"/>
           </a:p>
@@ -5104,7 +5007,7 @@
           <a:p>
             <a:fld id="{C873B183-A821-4095-A363-9EC968635539}" type="datetimeFigureOut">
               <a:rPr lang="en-US" dirty="0"/>
-              <a:t>6/12/2025</a:t>
+              <a:t>6/13/2025</a:t>
             </a:fld>
             <a:endParaRPr lang="en-US"/>
           </a:p>
@@ -5912,7 +5815,7 @@
           <a:p>
             <a:fld id="{174D01B4-0AA5-45E6-B2E6-5FA4078AEBCF}" type="datetimeFigureOut">
               <a:rPr lang="en-US" dirty="0"/>
-              <a:t>6/12/2025</a:t>
+              <a:t>6/13/2025</a:t>
             </a:fld>
             <a:endParaRPr lang="en-US"/>
           </a:p>
@@ -6557,7 +6460,7 @@
           <a:p>
             <a:fld id="{4147335C-0450-40D7-8612-B3203BED4F28}" type="datetimeFigureOut">
               <a:rPr lang="en-US" dirty="0"/>
-              <a:t>6/12/2025</a:t>
+              <a:t>6/13/2025</a:t>
             </a:fld>
             <a:endParaRPr lang="en-US"/>
           </a:p>
@@ -7400,7 +7303,7 @@
           <a:p>
             <a:fld id="{D246A105-2A1C-4284-B4EA-07CF89B1A393}" type="datetimeFigureOut">
               <a:rPr lang="en-US" dirty="0"/>
-              <a:t>6/12/2025</a:t>
+              <a:t>6/13/2025</a:t>
             </a:fld>
             <a:endParaRPr lang="en-US"/>
           </a:p>
@@ -7573,7 +7476,7 @@
           <a:p>
             <a:fld id="{80DBE609-F3F2-45E6-BD6A-E03A8C86C1AE}" type="datetimeFigureOut">
               <a:rPr lang="en-US" dirty="0"/>
-              <a:t>6/12/2025</a:t>
+              <a:t>6/13/2025</a:t>
             </a:fld>
             <a:endParaRPr lang="en-US"/>
           </a:p>
@@ -8569,7 +8472,7 @@
           <a:p>
             <a:fld id="{7A24AD68-089C-4467-A8F3-EA2BBCA6B44E}" type="datetimeFigureOut">
               <a:rPr lang="en-US" dirty="0"/>
-              <a:t>6/12/2025</a:t>
+              <a:t>6/13/2025</a:t>
             </a:fld>
             <a:endParaRPr lang="en-US"/>
           </a:p>
@@ -9311,7 +9214,7 @@
             <a:fld id="{1E700B27-DE4C-4B9E-BB11-B9027034A00F}" type="datetimeFigureOut">
               <a:rPr lang="en-US" dirty="0"/>
               <a:pPr/>
-              <a:t>6/12/2025</a:t>
+              <a:t>6/13/2025</a:t>
             </a:fld>
             <a:endParaRPr lang="en-US"/>
           </a:p>
@@ -9654,7 +9557,7 @@
           <a:p>
             <a:fld id="{75C51FCE-E4BB-4680-8E50-3C0E348D2609}" type="datetimeFigureOut">
               <a:rPr lang="en-US" dirty="0"/>
-              <a:t>6/12/2025</a:t>
+              <a:t>6/13/2025</a:t>
             </a:fld>
             <a:endParaRPr lang="en-US"/>
           </a:p>
@@ -10715,7 +10618,7 @@
           <a:p>
             <a:fld id="{8AAA073D-A903-47F8-8D16-77642FB0DF1F}" type="datetimeFigureOut">
               <a:rPr lang="en-US" dirty="0"/>
-              <a:t>6/12/2025</a:t>
+              <a:t>6/13/2025</a:t>
             </a:fld>
             <a:endParaRPr lang="en-US"/>
           </a:p>
@@ -11135,7 +11038,7 @@
           <a:p>
             <a:fld id="{C3F425EA-B9DC-48A7-991E-9A82573B1B21}" type="datetimeFigureOut">
               <a:rPr lang="en-US" dirty="0"/>
-              <a:t>6/12/2025</a:t>
+              <a:t>6/13/2025</a:t>
             </a:fld>
             <a:endParaRPr lang="en-US"/>
           </a:p>
@@ -11257,7 +11160,7 @@
           <a:p>
             <a:fld id="{66CB97F8-6CEB-469B-AFCC-889F2A2B1D5A}" type="datetimeFigureOut">
               <a:rPr lang="en-US" dirty="0"/>
-              <a:t>6/12/2025</a:t>
+              <a:t>6/13/2025</a:t>
             </a:fld>
             <a:endParaRPr lang="en-US"/>
           </a:p>
@@ -11357,7 +11260,7 @@
           <a:p>
             <a:fld id="{8FA9179F-009E-4FA5-B091-7EBB82A185BD}" type="datetimeFigureOut">
               <a:rPr lang="en-US" dirty="0"/>
-              <a:t>6/12/2025</a:t>
+              <a:t>6/13/2025</a:t>
             </a:fld>
             <a:endParaRPr lang="en-US"/>
           </a:p>
@@ -12469,7 +12372,7 @@
           <a:p>
             <a:fld id="{8E665CEB-0076-4E37-B880-BCEA9784DE0A}" type="datetimeFigureOut">
               <a:rPr lang="en-US" dirty="0"/>
-              <a:t>6/12/2025</a:t>
+              <a:t>6/13/2025</a:t>
             </a:fld>
             <a:endParaRPr lang="en-US"/>
           </a:p>
@@ -13605,7 +13508,7 @@
           <a:p>
             <a:fld id="{A6149E5E-3896-4118-99A7-7B85668F1C5E}" type="datetimeFigureOut">
               <a:rPr lang="en-US" dirty="0"/>
-              <a:t>6/12/2025</a:t>
+              <a:t>6/13/2025</a:t>
             </a:fld>
             <a:endParaRPr lang="en-US"/>
           </a:p>
@@ -14704,7 +14607,7 @@
           <a:p>
             <a:fld id="{C40F4739-9812-4A9F-890D-2AD6BA5F6EE8}" type="datetimeFigureOut">
               <a:rPr lang="en-US" dirty="0"/>
-              <a:t>6/12/2025</a:t>
+              <a:t>6/13/2025</a:t>
             </a:fld>
             <a:endParaRPr lang="en-US"/>
           </a:p>
@@ -15656,7 +15559,7 @@
           <a:p>
             <a:fld id="{18845AC5-A3F8-44AA-BA8F-596CDCC976D3}" type="datetimeFigureOut">
               <a:rPr lang="en-US" dirty="0"/>
-              <a:t>6/12/2025</a:t>
+              <a:t>6/13/2025</a:t>
             </a:fld>
             <a:endParaRPr lang="en-US"/>
           </a:p>
@@ -16830,7 +16733,7 @@
           <a:p>
             <a:fld id="{C873B183-A821-4095-A363-9EC968635539}" type="datetimeFigureOut">
               <a:rPr lang="en-US" dirty="0"/>
-              <a:t>6/12/2025</a:t>
+              <a:t>6/13/2025</a:t>
             </a:fld>
             <a:endParaRPr lang="en-US"/>
           </a:p>
@@ -17902,7 +17805,7 @@
           <a:p>
             <a:fld id="{174D01B4-0AA5-45E6-B2E6-5FA4078AEBCF}" type="datetimeFigureOut">
               <a:rPr lang="en-US" dirty="0"/>
-              <a:t>6/12/2025</a:t>
+              <a:t>6/13/2025</a:t>
             </a:fld>
             <a:endParaRPr lang="en-US"/>
           </a:p>
@@ -18878,7 +18781,7 @@
           <a:p>
             <a:fld id="{8AAA073D-A903-47F8-8D16-77642FB0DF1F}" type="datetimeFigureOut">
               <a:rPr lang="en-US" dirty="0"/>
-              <a:t>6/12/2025</a:t>
+              <a:t>6/13/2025</a:t>
             </a:fld>
             <a:endParaRPr lang="en-US"/>
           </a:p>
@@ -19523,7 +19426,7 @@
           <a:p>
             <a:fld id="{4147335C-0450-40D7-8612-B3203BED4F28}" type="datetimeFigureOut">
               <a:rPr lang="en-US" dirty="0"/>
-              <a:t>6/12/2025</a:t>
+              <a:t>6/13/2025</a:t>
             </a:fld>
             <a:endParaRPr lang="en-US"/>
           </a:p>
@@ -20371,7 +20274,7 @@
           <a:p>
             <a:fld id="{D246A105-2A1C-4284-B4EA-07CF89B1A393}" type="datetimeFigureOut">
               <a:rPr lang="en-US" dirty="0"/>
-              <a:t>6/12/2025</a:t>
+              <a:t>6/13/2025</a:t>
             </a:fld>
             <a:endParaRPr lang="en-US"/>
           </a:p>
@@ -20549,7 +20452,7 @@
           <a:p>
             <a:fld id="{80DBE609-F3F2-45E6-BD6A-E03A8C86C1AE}" type="datetimeFigureOut">
               <a:rPr lang="en-US" dirty="0"/>
-              <a:t>6/12/2025</a:t>
+              <a:t>6/13/2025</a:t>
             </a:fld>
             <a:endParaRPr lang="en-US"/>
           </a:p>
@@ -21550,7 +21453,7 @@
           <a:p>
             <a:fld id="{7A24AD68-089C-4467-A8F3-EA2BBCA6B44E}" type="datetimeFigureOut">
               <a:rPr lang="en-US" dirty="0"/>
-              <a:t>6/12/2025</a:t>
+              <a:t>6/13/2025</a:t>
             </a:fld>
             <a:endParaRPr lang="en-US"/>
           </a:p>
@@ -21824,7 +21727,7 @@
           <a:p>
             <a:fld id="{AB91FA40-626B-4CA1-85D0-7A9016E395BA}" type="datetimeFigureOut">
               <a:rPr lang="en-US" dirty="0"/>
-              <a:t>6/12/2025</a:t>
+              <a:t>6/13/2025</a:t>
             </a:fld>
             <a:endParaRPr lang="en-US"/>
           </a:p>
@@ -22203,7 +22106,7 @@
           <a:p>
             <a:fld id="{C3F425EA-B9DC-48A7-991E-9A82573B1B21}" type="datetimeFigureOut">
               <a:rPr lang="en-US" dirty="0"/>
-              <a:t>6/12/2025</a:t>
+              <a:t>6/13/2025</a:t>
             </a:fld>
             <a:endParaRPr lang="en-US"/>
           </a:p>
@@ -22320,7 +22223,7 @@
           <a:p>
             <a:fld id="{66CB97F8-6CEB-469B-AFCC-889F2A2B1D5A}" type="datetimeFigureOut">
               <a:rPr lang="en-US" dirty="0"/>
-              <a:t>6/12/2025</a:t>
+              <a:t>6/13/2025</a:t>
             </a:fld>
             <a:endParaRPr lang="en-US"/>
           </a:p>
@@ -22415,7 +22318,7 @@
           <a:p>
             <a:fld id="{8FA9179F-009E-4FA5-B091-7EBB82A185BD}" type="datetimeFigureOut">
               <a:rPr lang="en-US" dirty="0"/>
-              <a:t>6/12/2025</a:t>
+              <a:t>6/13/2025</a:t>
             </a:fld>
             <a:endParaRPr lang="en-US"/>
           </a:p>
@@ -23522,7 +23425,7 @@
           <a:p>
             <a:fld id="{8E665CEB-0076-4E37-B880-BCEA9784DE0A}" type="datetimeFigureOut">
               <a:rPr lang="en-US" dirty="0"/>
-              <a:t>6/12/2025</a:t>
+              <a:t>6/13/2025</a:t>
             </a:fld>
             <a:endParaRPr lang="en-US"/>
           </a:p>
@@ -24653,7 +24556,7 @@
           <a:p>
             <a:fld id="{A6149E5E-3896-4118-99A7-7B85668F1C5E}" type="datetimeFigureOut">
               <a:rPr lang="en-US" dirty="0"/>
-              <a:t>6/12/2025</a:t>
+              <a:t>6/13/2025</a:t>
             </a:fld>
             <a:endParaRPr lang="en-US"/>
           </a:p>
@@ -25553,7 +25456,7 @@
           <a:p>
             <a:fld id="{7E0D914D-B099-4142-A885-11F276715148}" type="datetimeFigureOut">
               <a:rPr lang="en-US" dirty="0"/>
-              <a:t>6/12/2025</a:t>
+              <a:t>6/13/2025</a:t>
             </a:fld>
             <a:endParaRPr lang="en-US"/>
           </a:p>
@@ -26901,7 +26804,7 @@
           <a:p>
             <a:fld id="{7E0D914D-B099-4142-A885-11F276715148}" type="datetimeFigureOut">
               <a:rPr lang="en-US" dirty="0"/>
-              <a:t>6/12/2025</a:t>
+              <a:t>6/13/2025</a:t>
             </a:fld>
             <a:endParaRPr lang="en-US"/>
           </a:p>
@@ -32303,1383 +32206,6 @@
 </p:sld>
 </file>
 
-<file path=ppt/slides/slide12.xml><?xml version="1.0" encoding="utf-8"?>
-<p:sld xmlns:a="http://schemas.openxmlformats.org/drawingml/2006/main" xmlns:r="http://schemas.openxmlformats.org/officeDocument/2006/relationships" xmlns:p="http://schemas.openxmlformats.org/presentationml/2006/main">
-  <p:cSld>
-    <p:spTree>
-      <p:nvGrpSpPr>
-        <p:cNvPr id="1" name=""/>
-        <p:cNvGrpSpPr/>
-        <p:nvPr/>
-      </p:nvGrpSpPr>
-      <p:grpSpPr>
-        <a:xfrm>
-          <a:off x="0" y="0"/>
-          <a:ext cx="0" cy="0"/>
-          <a:chOff x="0" y="0"/>
-          <a:chExt cx="0" cy="0"/>
-        </a:xfrm>
-      </p:grpSpPr>
-      <p:pic>
-        <p:nvPicPr>
-          <p:cNvPr id="10" name="Picture 9">
-            <a:extLst>
-              <a:ext uri="{FF2B5EF4-FFF2-40B4-BE49-F238E27FC236}">
-                <a16:creationId xmlns:a16="http://schemas.microsoft.com/office/drawing/2014/main" id="{9C52D20C-F7B6-4C3A-9523-F4E36CC188F0}"/>
-              </a:ext>
-            </a:extLst>
-          </p:cNvPr>
-          <p:cNvPicPr>
-            <a:picLocks noChangeAspect="1"/>
-          </p:cNvPicPr>
-          <p:nvPr/>
-        </p:nvPicPr>
-        <p:blipFill>
-          <a:blip r:embed="rId3"/>
-          <a:stretch>
-            <a:fillRect/>
-          </a:stretch>
-        </p:blipFill>
-        <p:spPr>
-          <a:xfrm>
-            <a:off x="891291" y="3914236"/>
-            <a:ext cx="1838582" cy="2410161"/>
-          </a:xfrm>
-          <a:prstGeom prst="rect">
-            <a:avLst/>
-          </a:prstGeom>
-        </p:spPr>
-      </p:pic>
-      <p:sp>
-        <p:nvSpPr>
-          <p:cNvPr id="2" name="Title 1">
-            <a:extLst>
-              <a:ext uri="{FF2B5EF4-FFF2-40B4-BE49-F238E27FC236}">
-                <a16:creationId xmlns:a16="http://schemas.microsoft.com/office/drawing/2014/main" id="{A9A0CCF1-FABD-4371-93E4-CE2208F27D0A}"/>
-              </a:ext>
-            </a:extLst>
-          </p:cNvPr>
-          <p:cNvSpPr>
-            <a:spLocks noGrp="1"/>
-          </p:cNvSpPr>
-          <p:nvPr>
-            <p:ph type="title"/>
-          </p:nvPr>
-        </p:nvSpPr>
-        <p:spPr/>
-        <p:txBody>
-          <a:bodyPr/>
-          <a:lstStyle/>
-          <a:p>
-            <a:r>
-              <a:rPr lang="en-GB" sz="3200" dirty="0"/>
-              <a:t>Some (even more) advanced models</a:t>
-            </a:r>
-          </a:p>
-        </p:txBody>
-      </p:sp>
-      <p:sp>
-        <p:nvSpPr>
-          <p:cNvPr id="3" name="Text Placeholder 2">
-            <a:extLst>
-              <a:ext uri="{FF2B5EF4-FFF2-40B4-BE49-F238E27FC236}">
-                <a16:creationId xmlns:a16="http://schemas.microsoft.com/office/drawing/2014/main" id="{915187CD-07D8-48AC-8AFB-63AF0B62A14C}"/>
-              </a:ext>
-            </a:extLst>
-          </p:cNvPr>
-          <p:cNvSpPr>
-            <a:spLocks noGrp="1"/>
-          </p:cNvSpPr>
-          <p:nvPr>
-            <p:ph type="body" idx="1"/>
-          </p:nvPr>
-        </p:nvSpPr>
-        <p:spPr/>
-        <p:txBody>
-          <a:bodyPr/>
-          <a:lstStyle/>
-          <a:p>
-            <a:r>
-              <a:rPr lang="en-GB" b="1" dirty="0">
-                <a:solidFill>
-                  <a:schemeClr val="tx1"/>
-                </a:solidFill>
-              </a:rPr>
-              <a:t>Multi-level Modelling</a:t>
-            </a:r>
-          </a:p>
-        </p:txBody>
-      </p:sp>
-      <p:sp>
-        <p:nvSpPr>
-          <p:cNvPr id="4" name="Content Placeholder 3">
-            <a:extLst>
-              <a:ext uri="{FF2B5EF4-FFF2-40B4-BE49-F238E27FC236}">
-                <a16:creationId xmlns:a16="http://schemas.microsoft.com/office/drawing/2014/main" id="{9A985A67-D878-42B5-8D89-DDFCE88331D8}"/>
-              </a:ext>
-            </a:extLst>
-          </p:cNvPr>
-          <p:cNvSpPr>
-            <a:spLocks noGrp="1"/>
-          </p:cNvSpPr>
-          <p:nvPr>
-            <p:ph sz="half" idx="2"/>
-          </p:nvPr>
-        </p:nvSpPr>
-        <p:spPr/>
-        <p:txBody>
-          <a:bodyPr/>
-          <a:lstStyle/>
-          <a:p>
-            <a:r>
-              <a:rPr lang="en-GB" dirty="0"/>
-              <a:t>Good for when you have dependent structures in your data.</a:t>
-            </a:r>
-          </a:p>
-        </p:txBody>
-      </p:sp>
-      <p:sp>
-        <p:nvSpPr>
-          <p:cNvPr id="5" name="Text Placeholder 4">
-            <a:extLst>
-              <a:ext uri="{FF2B5EF4-FFF2-40B4-BE49-F238E27FC236}">
-                <a16:creationId xmlns:a16="http://schemas.microsoft.com/office/drawing/2014/main" id="{BCA03C16-326B-4817-902C-30590AF42529}"/>
-              </a:ext>
-            </a:extLst>
-          </p:cNvPr>
-          <p:cNvSpPr>
-            <a:spLocks noGrp="1"/>
-          </p:cNvSpPr>
-          <p:nvPr>
-            <p:ph type="body" sz="quarter" idx="3"/>
-          </p:nvPr>
-        </p:nvSpPr>
-        <p:spPr/>
-        <p:txBody>
-          <a:bodyPr/>
-          <a:lstStyle/>
-          <a:p>
-            <a:r>
-              <a:rPr lang="en-GB" b="1" dirty="0">
-                <a:solidFill>
-                  <a:schemeClr val="tx1"/>
-                </a:solidFill>
-              </a:rPr>
-              <a:t>Structural Equation Modelling</a:t>
-            </a:r>
-          </a:p>
-        </p:txBody>
-      </p:sp>
-      <p:sp>
-        <p:nvSpPr>
-          <p:cNvPr id="6" name="Content Placeholder 5">
-            <a:extLst>
-              <a:ext uri="{FF2B5EF4-FFF2-40B4-BE49-F238E27FC236}">
-                <a16:creationId xmlns:a16="http://schemas.microsoft.com/office/drawing/2014/main" id="{B8E0E8F6-DE00-4B41-928E-DA4B7A61F993}"/>
-              </a:ext>
-            </a:extLst>
-          </p:cNvPr>
-          <p:cNvSpPr>
-            <a:spLocks noGrp="1"/>
-          </p:cNvSpPr>
-          <p:nvPr>
-            <p:ph sz="quarter" idx="4"/>
-          </p:nvPr>
-        </p:nvSpPr>
-        <p:spPr>
-          <a:xfrm>
-            <a:off x="6208710" y="3179762"/>
-            <a:ext cx="5164140" cy="2840039"/>
-          </a:xfrm>
-        </p:spPr>
-        <p:txBody>
-          <a:bodyPr/>
-          <a:lstStyle/>
-          <a:p>
-            <a:r>
-              <a:rPr lang="en-GB" dirty="0"/>
-              <a:t>Good for exploring complex relationships hypothesis in path diagrams. </a:t>
-            </a:r>
-          </a:p>
-        </p:txBody>
-      </p:sp>
-      <p:pic>
-        <p:nvPicPr>
-          <p:cNvPr id="8" name="Picture 7" descr="An example path analysis diagram, which could be used as a the basis for building a structural equation model. Proposing relationships between someone's self-reporting levels of happiness and multiple inter-related personal and environmental factors. ">
-            <a:extLst>
-              <a:ext uri="{FF2B5EF4-FFF2-40B4-BE49-F238E27FC236}">
-                <a16:creationId xmlns:a16="http://schemas.microsoft.com/office/drawing/2014/main" id="{326B5A03-C2E2-4907-AE0F-FBF29CA0444D}"/>
-              </a:ext>
-            </a:extLst>
-          </p:cNvPr>
-          <p:cNvPicPr>
-            <a:picLocks noChangeAspect="1"/>
-          </p:cNvPicPr>
-          <p:nvPr/>
-        </p:nvPicPr>
-        <p:blipFill>
-          <a:blip r:embed="rId4"/>
-          <a:stretch>
-            <a:fillRect/>
-          </a:stretch>
-        </p:blipFill>
-        <p:spPr>
-          <a:xfrm>
-            <a:off x="6642519" y="3954040"/>
-            <a:ext cx="3957544" cy="2214318"/>
-          </a:xfrm>
-          <a:prstGeom prst="rect">
-            <a:avLst/>
-          </a:prstGeom>
-        </p:spPr>
-      </p:pic>
-      <p:sp>
-        <p:nvSpPr>
-          <p:cNvPr id="12" name="Rectangle: Rounded Corners 11">
-            <a:extLst>
-              <a:ext uri="{FF2B5EF4-FFF2-40B4-BE49-F238E27FC236}">
-                <a16:creationId xmlns:a16="http://schemas.microsoft.com/office/drawing/2014/main" id="{AC21D8AE-5C05-4670-AC3A-27BCD9E846A9}"/>
-              </a:ext>
-            </a:extLst>
-          </p:cNvPr>
-          <p:cNvSpPr/>
-          <p:nvPr/>
-        </p:nvSpPr>
-        <p:spPr>
-          <a:xfrm>
-            <a:off x="2887447" y="4046449"/>
-            <a:ext cx="1360170" cy="321520"/>
-          </a:xfrm>
-          <a:prstGeom prst="roundRect">
-            <a:avLst/>
-          </a:prstGeom>
-        </p:spPr>
-        <p:style>
-          <a:lnRef idx="2">
-            <a:schemeClr val="accent1">
-              <a:shade val="50000"/>
-            </a:schemeClr>
-          </a:lnRef>
-          <a:fillRef idx="1">
-            <a:schemeClr val="accent1"/>
-          </a:fillRef>
-          <a:effectRef idx="0">
-            <a:schemeClr val="accent1"/>
-          </a:effectRef>
-          <a:fontRef idx="minor">
-            <a:schemeClr val="lt1"/>
-          </a:fontRef>
-        </p:style>
-        <p:txBody>
-          <a:bodyPr rtlCol="0" anchor="ctr"/>
-          <a:lstStyle/>
-          <a:p>
-            <a:pPr marL="0" marR="0" lvl="0" indent="0" algn="ctr" defTabSz="457200" rtl="0" eaLnBrk="1" fontAlgn="auto" latinLnBrk="0" hangingPunct="1">
-              <a:lnSpc>
-                <a:spcPct val="100000"/>
-              </a:lnSpc>
-              <a:spcBef>
-                <a:spcPts val="0"/>
-              </a:spcBef>
-              <a:spcAft>
-                <a:spcPts val="0"/>
-              </a:spcAft>
-              <a:buClrTx/>
-              <a:buSzTx/>
-              <a:buFontTx/>
-              <a:buNone/>
-              <a:tabLst/>
-              <a:defRPr/>
-            </a:pPr>
-            <a:r>
-              <a:rPr kumimoji="0" lang="en-GB" sz="1800" b="0" i="0" u="none" strike="noStrike" kern="1200" cap="none" spc="0" normalizeH="0" baseline="0" noProof="0" dirty="0">
-                <a:ln>
-                  <a:noFill/>
-                </a:ln>
-                <a:solidFill>
-                  <a:prstClr val="white"/>
-                </a:solidFill>
-                <a:effectLst/>
-                <a:uLnTx/>
-                <a:uFillTx/>
-                <a:latin typeface="Century Gothic" panose="020B0502020202020204"/>
-                <a:ea typeface="+mn-ea"/>
-                <a:cs typeface="+mn-cs"/>
-              </a:rPr>
-              <a:t>School 1</a:t>
-            </a:r>
-          </a:p>
-        </p:txBody>
-      </p:sp>
-      <p:sp>
-        <p:nvSpPr>
-          <p:cNvPr id="13" name="Rectangle: Rounded Corners 12">
-            <a:extLst>
-              <a:ext uri="{FF2B5EF4-FFF2-40B4-BE49-F238E27FC236}">
-                <a16:creationId xmlns:a16="http://schemas.microsoft.com/office/drawing/2014/main" id="{29DA8719-37E8-48AD-9846-0B34FAFAC145}"/>
-              </a:ext>
-            </a:extLst>
-          </p:cNvPr>
-          <p:cNvSpPr/>
-          <p:nvPr/>
-        </p:nvSpPr>
-        <p:spPr>
-          <a:xfrm>
-            <a:off x="2887447" y="4528442"/>
-            <a:ext cx="1360170" cy="321520"/>
-          </a:xfrm>
-          <a:prstGeom prst="roundRect">
-            <a:avLst/>
-          </a:prstGeom>
-        </p:spPr>
-        <p:style>
-          <a:lnRef idx="2">
-            <a:schemeClr val="accent3">
-              <a:shade val="50000"/>
-            </a:schemeClr>
-          </a:lnRef>
-          <a:fillRef idx="1">
-            <a:schemeClr val="accent3"/>
-          </a:fillRef>
-          <a:effectRef idx="0">
-            <a:schemeClr val="accent3"/>
-          </a:effectRef>
-          <a:fontRef idx="minor">
-            <a:schemeClr val="lt1"/>
-          </a:fontRef>
-        </p:style>
-        <p:txBody>
-          <a:bodyPr rtlCol="0" anchor="ctr"/>
-          <a:lstStyle/>
-          <a:p>
-            <a:pPr marL="0" marR="0" lvl="0" indent="0" algn="ctr" defTabSz="457200" rtl="0" eaLnBrk="1" fontAlgn="auto" latinLnBrk="0" hangingPunct="1">
-              <a:lnSpc>
-                <a:spcPct val="100000"/>
-              </a:lnSpc>
-              <a:spcBef>
-                <a:spcPts val="0"/>
-              </a:spcBef>
-              <a:spcAft>
-                <a:spcPts val="0"/>
-              </a:spcAft>
-              <a:buClrTx/>
-              <a:buSzTx/>
-              <a:buFontTx/>
-              <a:buNone/>
-              <a:tabLst/>
-              <a:defRPr/>
-            </a:pPr>
-            <a:r>
-              <a:rPr kumimoji="0" lang="en-GB" sz="1800" b="0" i="0" u="none" strike="noStrike" kern="1200" cap="none" spc="0" normalizeH="0" baseline="0" noProof="0" dirty="0">
-                <a:ln>
-                  <a:noFill/>
-                </a:ln>
-                <a:solidFill>
-                  <a:prstClr val="white"/>
-                </a:solidFill>
-                <a:effectLst/>
-                <a:uLnTx/>
-                <a:uFillTx/>
-                <a:latin typeface="Century Gothic" panose="020B0502020202020204"/>
-                <a:ea typeface="+mn-ea"/>
-                <a:cs typeface="+mn-cs"/>
-              </a:rPr>
-              <a:t>School 2</a:t>
-            </a:r>
-          </a:p>
-        </p:txBody>
-      </p:sp>
-      <p:sp>
-        <p:nvSpPr>
-          <p:cNvPr id="14" name="Rectangle: Rounded Corners 13">
-            <a:extLst>
-              <a:ext uri="{FF2B5EF4-FFF2-40B4-BE49-F238E27FC236}">
-                <a16:creationId xmlns:a16="http://schemas.microsoft.com/office/drawing/2014/main" id="{D8F1EF16-A7CC-43FE-9A28-55C523FCE6D8}"/>
-              </a:ext>
-            </a:extLst>
-          </p:cNvPr>
-          <p:cNvSpPr/>
-          <p:nvPr/>
-        </p:nvSpPr>
-        <p:spPr>
-          <a:xfrm>
-            <a:off x="2884898" y="4959888"/>
-            <a:ext cx="1360170" cy="321520"/>
-          </a:xfrm>
-          <a:prstGeom prst="roundRect">
-            <a:avLst/>
-          </a:prstGeom>
-        </p:spPr>
-        <p:style>
-          <a:lnRef idx="2">
-            <a:schemeClr val="accent1">
-              <a:shade val="50000"/>
-            </a:schemeClr>
-          </a:lnRef>
-          <a:fillRef idx="1">
-            <a:schemeClr val="accent1"/>
-          </a:fillRef>
-          <a:effectRef idx="0">
-            <a:schemeClr val="accent1"/>
-          </a:effectRef>
-          <a:fontRef idx="minor">
-            <a:schemeClr val="lt1"/>
-          </a:fontRef>
-        </p:style>
-        <p:txBody>
-          <a:bodyPr rtlCol="0" anchor="ctr"/>
-          <a:lstStyle/>
-          <a:p>
-            <a:pPr marL="0" marR="0" lvl="0" indent="0" algn="ctr" defTabSz="457200" rtl="0" eaLnBrk="1" fontAlgn="auto" latinLnBrk="0" hangingPunct="1">
-              <a:lnSpc>
-                <a:spcPct val="100000"/>
-              </a:lnSpc>
-              <a:spcBef>
-                <a:spcPts val="0"/>
-              </a:spcBef>
-              <a:spcAft>
-                <a:spcPts val="0"/>
-              </a:spcAft>
-              <a:buClrTx/>
-              <a:buSzTx/>
-              <a:buFontTx/>
-              <a:buNone/>
-              <a:tabLst/>
-              <a:defRPr/>
-            </a:pPr>
-            <a:r>
-              <a:rPr kumimoji="0" lang="en-GB" sz="1800" b="0" i="0" u="none" strike="noStrike" kern="1200" cap="none" spc="0" normalizeH="0" baseline="0" noProof="0" dirty="0">
-                <a:ln>
-                  <a:noFill/>
-                </a:ln>
-                <a:solidFill>
-                  <a:prstClr val="white"/>
-                </a:solidFill>
-                <a:effectLst/>
-                <a:uLnTx/>
-                <a:uFillTx/>
-                <a:latin typeface="Century Gothic" panose="020B0502020202020204"/>
-                <a:ea typeface="+mn-ea"/>
-                <a:cs typeface="+mn-cs"/>
-              </a:rPr>
-              <a:t>School 3</a:t>
-            </a:r>
-          </a:p>
-        </p:txBody>
-      </p:sp>
-      <p:sp>
-        <p:nvSpPr>
-          <p:cNvPr id="15" name="Rectangle: Rounded Corners 14">
-            <a:extLst>
-              <a:ext uri="{FF2B5EF4-FFF2-40B4-BE49-F238E27FC236}">
-                <a16:creationId xmlns:a16="http://schemas.microsoft.com/office/drawing/2014/main" id="{D4F4FD4F-C090-4F34-9E7C-5656DD755BC2}"/>
-              </a:ext>
-            </a:extLst>
-          </p:cNvPr>
-          <p:cNvSpPr/>
-          <p:nvPr/>
-        </p:nvSpPr>
-        <p:spPr>
-          <a:xfrm>
-            <a:off x="2884898" y="5423457"/>
-            <a:ext cx="1360170" cy="321520"/>
-          </a:xfrm>
-          <a:prstGeom prst="roundRect">
-            <a:avLst/>
-          </a:prstGeom>
-        </p:spPr>
-        <p:style>
-          <a:lnRef idx="2">
-            <a:schemeClr val="accent3">
-              <a:shade val="50000"/>
-            </a:schemeClr>
-          </a:lnRef>
-          <a:fillRef idx="1">
-            <a:schemeClr val="accent3"/>
-          </a:fillRef>
-          <a:effectRef idx="0">
-            <a:schemeClr val="accent3"/>
-          </a:effectRef>
-          <a:fontRef idx="minor">
-            <a:schemeClr val="lt1"/>
-          </a:fontRef>
-        </p:style>
-        <p:txBody>
-          <a:bodyPr rtlCol="0" anchor="ctr"/>
-          <a:lstStyle/>
-          <a:p>
-            <a:pPr marL="0" marR="0" lvl="0" indent="0" algn="ctr" defTabSz="457200" rtl="0" eaLnBrk="1" fontAlgn="auto" latinLnBrk="0" hangingPunct="1">
-              <a:lnSpc>
-                <a:spcPct val="100000"/>
-              </a:lnSpc>
-              <a:spcBef>
-                <a:spcPts val="0"/>
-              </a:spcBef>
-              <a:spcAft>
-                <a:spcPts val="0"/>
-              </a:spcAft>
-              <a:buClrTx/>
-              <a:buSzTx/>
-              <a:buFontTx/>
-              <a:buNone/>
-              <a:tabLst/>
-              <a:defRPr/>
-            </a:pPr>
-            <a:r>
-              <a:rPr kumimoji="0" lang="en-GB" sz="1800" b="0" i="0" u="none" strike="noStrike" kern="1200" cap="none" spc="0" normalizeH="0" baseline="0" noProof="0" dirty="0">
-                <a:ln>
-                  <a:noFill/>
-                </a:ln>
-                <a:solidFill>
-                  <a:prstClr val="white"/>
-                </a:solidFill>
-                <a:effectLst/>
-                <a:uLnTx/>
-                <a:uFillTx/>
-                <a:latin typeface="Century Gothic" panose="020B0502020202020204"/>
-                <a:ea typeface="+mn-ea"/>
-                <a:cs typeface="+mn-cs"/>
-              </a:rPr>
-              <a:t>School 4</a:t>
-            </a:r>
-          </a:p>
-        </p:txBody>
-      </p:sp>
-      <p:sp>
-        <p:nvSpPr>
-          <p:cNvPr id="16" name="Rectangle: Rounded Corners 15">
-            <a:extLst>
-              <a:ext uri="{FF2B5EF4-FFF2-40B4-BE49-F238E27FC236}">
-                <a16:creationId xmlns:a16="http://schemas.microsoft.com/office/drawing/2014/main" id="{49BAC5CE-61F0-429F-8042-C357BB5C42CD}"/>
-              </a:ext>
-            </a:extLst>
-          </p:cNvPr>
-          <p:cNvSpPr/>
-          <p:nvPr/>
-        </p:nvSpPr>
-        <p:spPr>
-          <a:xfrm>
-            <a:off x="2884898" y="5850947"/>
-            <a:ext cx="1360170" cy="321520"/>
-          </a:xfrm>
-          <a:prstGeom prst="roundRect">
-            <a:avLst/>
-          </a:prstGeom>
-        </p:spPr>
-        <p:style>
-          <a:lnRef idx="2">
-            <a:schemeClr val="accent1">
-              <a:shade val="50000"/>
-            </a:schemeClr>
-          </a:lnRef>
-          <a:fillRef idx="1">
-            <a:schemeClr val="accent1"/>
-          </a:fillRef>
-          <a:effectRef idx="0">
-            <a:schemeClr val="accent1"/>
-          </a:effectRef>
-          <a:fontRef idx="minor">
-            <a:schemeClr val="lt1"/>
-          </a:fontRef>
-        </p:style>
-        <p:txBody>
-          <a:bodyPr rtlCol="0" anchor="ctr"/>
-          <a:lstStyle/>
-          <a:p>
-            <a:pPr marL="0" marR="0" lvl="0" indent="0" algn="ctr" defTabSz="457200" rtl="0" eaLnBrk="1" fontAlgn="auto" latinLnBrk="0" hangingPunct="1">
-              <a:lnSpc>
-                <a:spcPct val="100000"/>
-              </a:lnSpc>
-              <a:spcBef>
-                <a:spcPts val="0"/>
-              </a:spcBef>
-              <a:spcAft>
-                <a:spcPts val="0"/>
-              </a:spcAft>
-              <a:buClrTx/>
-              <a:buSzTx/>
-              <a:buFontTx/>
-              <a:buNone/>
-              <a:tabLst/>
-              <a:defRPr/>
-            </a:pPr>
-            <a:r>
-              <a:rPr kumimoji="0" lang="en-GB" sz="1800" b="0" i="0" u="none" strike="noStrike" kern="1200" cap="none" spc="0" normalizeH="0" baseline="0" noProof="0" dirty="0">
-                <a:ln>
-                  <a:noFill/>
-                </a:ln>
-                <a:solidFill>
-                  <a:prstClr val="white"/>
-                </a:solidFill>
-                <a:effectLst/>
-                <a:uLnTx/>
-                <a:uFillTx/>
-                <a:latin typeface="Century Gothic" panose="020B0502020202020204"/>
-                <a:ea typeface="+mn-ea"/>
-                <a:cs typeface="+mn-cs"/>
-              </a:rPr>
-              <a:t>School 5</a:t>
-            </a:r>
-          </a:p>
-        </p:txBody>
-      </p:sp>
-      <p:sp>
-        <p:nvSpPr>
-          <p:cNvPr id="17" name="Rectangle: Rounded Corners 16">
-            <a:extLst>
-              <a:ext uri="{FF2B5EF4-FFF2-40B4-BE49-F238E27FC236}">
-                <a16:creationId xmlns:a16="http://schemas.microsoft.com/office/drawing/2014/main" id="{2D6CF8FE-7C30-4BFA-A9DE-82C054040E6D}"/>
-              </a:ext>
-            </a:extLst>
-          </p:cNvPr>
-          <p:cNvSpPr/>
-          <p:nvPr/>
-        </p:nvSpPr>
-        <p:spPr>
-          <a:xfrm>
-            <a:off x="2857646" y="6275065"/>
-            <a:ext cx="1360170" cy="321520"/>
-          </a:xfrm>
-          <a:prstGeom prst="roundRect">
-            <a:avLst/>
-          </a:prstGeom>
-        </p:spPr>
-        <p:style>
-          <a:lnRef idx="2">
-            <a:schemeClr val="accent3">
-              <a:shade val="50000"/>
-            </a:schemeClr>
-          </a:lnRef>
-          <a:fillRef idx="1">
-            <a:schemeClr val="accent3"/>
-          </a:fillRef>
-          <a:effectRef idx="0">
-            <a:schemeClr val="accent3"/>
-          </a:effectRef>
-          <a:fontRef idx="minor">
-            <a:schemeClr val="lt1"/>
-          </a:fontRef>
-        </p:style>
-        <p:txBody>
-          <a:bodyPr rtlCol="0" anchor="ctr"/>
-          <a:lstStyle/>
-          <a:p>
-            <a:pPr marL="0" marR="0" lvl="0" indent="0" algn="ctr" defTabSz="457200" rtl="0" eaLnBrk="1" fontAlgn="auto" latinLnBrk="0" hangingPunct="1">
-              <a:lnSpc>
-                <a:spcPct val="100000"/>
-              </a:lnSpc>
-              <a:spcBef>
-                <a:spcPts val="0"/>
-              </a:spcBef>
-              <a:spcAft>
-                <a:spcPts val="0"/>
-              </a:spcAft>
-              <a:buClrTx/>
-              <a:buSzTx/>
-              <a:buFontTx/>
-              <a:buNone/>
-              <a:tabLst/>
-              <a:defRPr/>
-            </a:pPr>
-            <a:r>
-              <a:rPr kumimoji="0" lang="en-GB" sz="1800" b="0" i="0" u="none" strike="noStrike" kern="1200" cap="none" spc="0" normalizeH="0" baseline="0" noProof="0" dirty="0">
-                <a:ln>
-                  <a:noFill/>
-                </a:ln>
-                <a:solidFill>
-                  <a:prstClr val="white"/>
-                </a:solidFill>
-                <a:effectLst/>
-                <a:uLnTx/>
-                <a:uFillTx/>
-                <a:latin typeface="Century Gothic" panose="020B0502020202020204"/>
-                <a:ea typeface="+mn-ea"/>
-                <a:cs typeface="+mn-cs"/>
-              </a:rPr>
-              <a:t>School 6</a:t>
-            </a:r>
-          </a:p>
-        </p:txBody>
-      </p:sp>
-      <p:sp>
-        <p:nvSpPr>
-          <p:cNvPr id="18" name="TextBox 17">
-            <a:extLst>
-              <a:ext uri="{FF2B5EF4-FFF2-40B4-BE49-F238E27FC236}">
-                <a16:creationId xmlns:a16="http://schemas.microsoft.com/office/drawing/2014/main" id="{9D5D0BD7-4721-4F9A-9550-4753E158F31F}"/>
-              </a:ext>
-            </a:extLst>
-          </p:cNvPr>
-          <p:cNvSpPr txBox="1"/>
-          <p:nvPr/>
-        </p:nvSpPr>
-        <p:spPr>
-          <a:xfrm>
-            <a:off x="4331213" y="4126869"/>
-            <a:ext cx="1513556" cy="646331"/>
-          </a:xfrm>
-          <a:prstGeom prst="rect">
-            <a:avLst/>
-          </a:prstGeom>
-          <a:noFill/>
-        </p:spPr>
-        <p:txBody>
-          <a:bodyPr wrap="none" rtlCol="0">
-            <a:spAutoFit/>
-          </a:bodyPr>
-          <a:lstStyle/>
-          <a:p>
-            <a:pPr marL="0" marR="0" lvl="0" indent="0" algn="l" defTabSz="457200" rtl="0" eaLnBrk="1" fontAlgn="auto" latinLnBrk="0" hangingPunct="1">
-              <a:lnSpc>
-                <a:spcPct val="100000"/>
-              </a:lnSpc>
-              <a:spcBef>
-                <a:spcPts val="0"/>
-              </a:spcBef>
-              <a:spcAft>
-                <a:spcPts val="0"/>
-              </a:spcAft>
-              <a:buClrTx/>
-              <a:buSzTx/>
-              <a:buFontTx/>
-              <a:buNone/>
-              <a:tabLst/>
-              <a:defRPr/>
-            </a:pPr>
-            <a:r>
-              <a:rPr kumimoji="0" lang="en-GB" sz="1800" b="0" i="0" u="none" strike="noStrike" kern="1200" cap="none" spc="0" normalizeH="0" baseline="0" noProof="0" dirty="0">
-                <a:ln>
-                  <a:noFill/>
-                </a:ln>
-                <a:solidFill>
-                  <a:prstClr val="black"/>
-                </a:solidFill>
-                <a:effectLst/>
-                <a:uLnTx/>
-                <a:uFillTx/>
-                <a:latin typeface="Century Gothic" panose="020B0502020202020204"/>
-                <a:ea typeface="+mn-ea"/>
-                <a:cs typeface="+mn-cs"/>
-              </a:rPr>
-              <a:t>Intervention</a:t>
-            </a:r>
-          </a:p>
-          <a:p>
-            <a:pPr marL="0" marR="0" lvl="0" indent="0" algn="l" defTabSz="457200" rtl="0" eaLnBrk="1" fontAlgn="auto" latinLnBrk="0" hangingPunct="1">
-              <a:lnSpc>
-                <a:spcPct val="100000"/>
-              </a:lnSpc>
-              <a:spcBef>
-                <a:spcPts val="0"/>
-              </a:spcBef>
-              <a:spcAft>
-                <a:spcPts val="0"/>
-              </a:spcAft>
-              <a:buClrTx/>
-              <a:buSzTx/>
-              <a:buFontTx/>
-              <a:buNone/>
-              <a:tabLst/>
-              <a:defRPr/>
-            </a:pPr>
-            <a:r>
-              <a:rPr kumimoji="0" lang="en-GB" sz="1800" b="0" i="0" u="none" strike="noStrike" kern="1200" cap="none" spc="0" normalizeH="0" baseline="0" noProof="0" dirty="0">
-                <a:ln>
-                  <a:noFill/>
-                </a:ln>
-                <a:solidFill>
-                  <a:prstClr val="black"/>
-                </a:solidFill>
-                <a:effectLst/>
-                <a:uLnTx/>
-                <a:uFillTx/>
-                <a:latin typeface="Century Gothic" panose="020B0502020202020204"/>
-                <a:ea typeface="+mn-ea"/>
-                <a:cs typeface="+mn-cs"/>
-              </a:rPr>
-              <a:t>Control</a:t>
-            </a:r>
-          </a:p>
-        </p:txBody>
-      </p:sp>
-      <p:sp>
-        <p:nvSpPr>
-          <p:cNvPr id="19" name="Rectangle 18">
-            <a:extLst>
-              <a:ext uri="{FF2B5EF4-FFF2-40B4-BE49-F238E27FC236}">
-                <a16:creationId xmlns:a16="http://schemas.microsoft.com/office/drawing/2014/main" id="{75A13FE1-3D05-403E-8CFC-247D577737CF}"/>
-              </a:ext>
-            </a:extLst>
-          </p:cNvPr>
-          <p:cNvSpPr/>
-          <p:nvPr/>
-        </p:nvSpPr>
-        <p:spPr>
-          <a:xfrm>
-            <a:off x="5787527" y="4219997"/>
-            <a:ext cx="226268" cy="200083"/>
-          </a:xfrm>
-          <a:prstGeom prst="rect">
-            <a:avLst/>
-          </a:prstGeom>
-        </p:spPr>
-        <p:style>
-          <a:lnRef idx="2">
-            <a:schemeClr val="accent1">
-              <a:shade val="50000"/>
-            </a:schemeClr>
-          </a:lnRef>
-          <a:fillRef idx="1">
-            <a:schemeClr val="accent1"/>
-          </a:fillRef>
-          <a:effectRef idx="0">
-            <a:schemeClr val="accent1"/>
-          </a:effectRef>
-          <a:fontRef idx="minor">
-            <a:schemeClr val="lt1"/>
-          </a:fontRef>
-        </p:style>
-        <p:txBody>
-          <a:bodyPr rtlCol="0" anchor="ctr"/>
-          <a:lstStyle/>
-          <a:p>
-            <a:pPr marL="0" marR="0" lvl="0" indent="0" algn="ctr" defTabSz="457200" rtl="0" eaLnBrk="1" fontAlgn="auto" latinLnBrk="0" hangingPunct="1">
-              <a:lnSpc>
-                <a:spcPct val="100000"/>
-              </a:lnSpc>
-              <a:spcBef>
-                <a:spcPts val="0"/>
-              </a:spcBef>
-              <a:spcAft>
-                <a:spcPts val="0"/>
-              </a:spcAft>
-              <a:buClrTx/>
-              <a:buSzTx/>
-              <a:buFontTx/>
-              <a:buNone/>
-              <a:tabLst/>
-              <a:defRPr/>
-            </a:pPr>
-            <a:endParaRPr kumimoji="0" lang="en-GB" sz="1800" b="0" i="0" u="none" strike="noStrike" kern="1200" cap="none" spc="0" normalizeH="0" baseline="0" noProof="0">
-              <a:ln>
-                <a:noFill/>
-              </a:ln>
-              <a:solidFill>
-                <a:prstClr val="white"/>
-              </a:solidFill>
-              <a:effectLst/>
-              <a:uLnTx/>
-              <a:uFillTx/>
-              <a:latin typeface="Century Gothic" panose="020B0502020202020204"/>
-              <a:ea typeface="+mn-ea"/>
-              <a:cs typeface="+mn-cs"/>
-            </a:endParaRPr>
-          </a:p>
-        </p:txBody>
-      </p:sp>
-      <p:sp>
-        <p:nvSpPr>
-          <p:cNvPr id="20" name="Rectangle 19">
-            <a:extLst>
-              <a:ext uri="{FF2B5EF4-FFF2-40B4-BE49-F238E27FC236}">
-                <a16:creationId xmlns:a16="http://schemas.microsoft.com/office/drawing/2014/main" id="{49F978D5-8843-43FF-824E-4D5971457AAE}"/>
-              </a:ext>
-            </a:extLst>
-          </p:cNvPr>
-          <p:cNvSpPr/>
-          <p:nvPr/>
-        </p:nvSpPr>
-        <p:spPr>
-          <a:xfrm>
-            <a:off x="5787527" y="4513208"/>
-            <a:ext cx="226268" cy="200083"/>
-          </a:xfrm>
-          <a:prstGeom prst="rect">
-            <a:avLst/>
-          </a:prstGeom>
-        </p:spPr>
-        <p:style>
-          <a:lnRef idx="2">
-            <a:schemeClr val="accent3">
-              <a:shade val="50000"/>
-            </a:schemeClr>
-          </a:lnRef>
-          <a:fillRef idx="1">
-            <a:schemeClr val="accent3"/>
-          </a:fillRef>
-          <a:effectRef idx="0">
-            <a:schemeClr val="accent3"/>
-          </a:effectRef>
-          <a:fontRef idx="minor">
-            <a:schemeClr val="lt1"/>
-          </a:fontRef>
-        </p:style>
-        <p:txBody>
-          <a:bodyPr rtlCol="0" anchor="ctr"/>
-          <a:lstStyle/>
-          <a:p>
-            <a:pPr marL="0" marR="0" lvl="0" indent="0" algn="ctr" defTabSz="457200" rtl="0" eaLnBrk="1" fontAlgn="auto" latinLnBrk="0" hangingPunct="1">
-              <a:lnSpc>
-                <a:spcPct val="100000"/>
-              </a:lnSpc>
-              <a:spcBef>
-                <a:spcPts val="0"/>
-              </a:spcBef>
-              <a:spcAft>
-                <a:spcPts val="0"/>
-              </a:spcAft>
-              <a:buClrTx/>
-              <a:buSzTx/>
-              <a:buFontTx/>
-              <a:buNone/>
-              <a:tabLst/>
-              <a:defRPr/>
-            </a:pPr>
-            <a:endParaRPr kumimoji="0" lang="en-GB" sz="1800" b="0" i="0" u="none" strike="noStrike" kern="1200" cap="none" spc="0" normalizeH="0" baseline="0" noProof="0">
-              <a:ln>
-                <a:noFill/>
-              </a:ln>
-              <a:solidFill>
-                <a:prstClr val="white"/>
-              </a:solidFill>
-              <a:effectLst/>
-              <a:uLnTx/>
-              <a:uFillTx/>
-              <a:latin typeface="Century Gothic" panose="020B0502020202020204"/>
-              <a:ea typeface="+mn-ea"/>
-              <a:cs typeface="+mn-cs"/>
-            </a:endParaRPr>
-          </a:p>
-        </p:txBody>
-      </p:sp>
-      <p:sp>
-        <p:nvSpPr>
-          <p:cNvPr id="21" name="Oval 20">
-            <a:extLst>
-              <a:ext uri="{FF2B5EF4-FFF2-40B4-BE49-F238E27FC236}">
-                <a16:creationId xmlns:a16="http://schemas.microsoft.com/office/drawing/2014/main" id="{7DBA105A-ACBA-4E9C-B078-DCEC2BB959AA}"/>
-              </a:ext>
-            </a:extLst>
-          </p:cNvPr>
-          <p:cNvSpPr/>
-          <p:nvPr/>
-        </p:nvSpPr>
-        <p:spPr>
-          <a:xfrm>
-            <a:off x="1672903" y="4378746"/>
-            <a:ext cx="298217" cy="320365"/>
-          </a:xfrm>
-          <a:prstGeom prst="ellipse">
-            <a:avLst/>
-          </a:prstGeom>
-          <a:noFill/>
-          <a:ln>
-            <a:noFill/>
-          </a:ln>
-        </p:spPr>
-        <p:style>
-          <a:lnRef idx="2">
-            <a:schemeClr val="accent1">
-              <a:shade val="50000"/>
-            </a:schemeClr>
-          </a:lnRef>
-          <a:fillRef idx="1">
-            <a:schemeClr val="accent1"/>
-          </a:fillRef>
-          <a:effectRef idx="0">
-            <a:schemeClr val="accent1"/>
-          </a:effectRef>
-          <a:fontRef idx="minor">
-            <a:schemeClr val="lt1"/>
-          </a:fontRef>
-        </p:style>
-        <p:txBody>
-          <a:bodyPr rtlCol="0" anchor="ctr"/>
-          <a:lstStyle/>
-          <a:p>
-            <a:pPr marL="0" marR="0" lvl="0" indent="0" algn="ctr" defTabSz="457200" rtl="0" eaLnBrk="1" fontAlgn="auto" latinLnBrk="0" hangingPunct="1">
-              <a:lnSpc>
-                <a:spcPct val="100000"/>
-              </a:lnSpc>
-              <a:spcBef>
-                <a:spcPts val="0"/>
-              </a:spcBef>
-              <a:spcAft>
-                <a:spcPts val="0"/>
-              </a:spcAft>
-              <a:buClrTx/>
-              <a:buSzTx/>
-              <a:buFontTx/>
-              <a:buNone/>
-              <a:tabLst/>
-              <a:defRPr/>
-            </a:pPr>
-            <a:endParaRPr kumimoji="0" lang="en-GB" sz="1800" b="0" i="0" u="none" strike="noStrike" kern="1200" cap="none" spc="0" normalizeH="0" baseline="0" noProof="0">
-              <a:ln>
-                <a:noFill/>
-              </a:ln>
-              <a:solidFill>
-                <a:prstClr val="white"/>
-              </a:solidFill>
-              <a:effectLst/>
-              <a:uLnTx/>
-              <a:uFillTx/>
-              <a:latin typeface="Century Gothic" panose="020B0502020202020204"/>
-              <a:ea typeface="+mn-ea"/>
-              <a:cs typeface="+mn-cs"/>
-            </a:endParaRPr>
-          </a:p>
-        </p:txBody>
-      </p:sp>
-      <p:cxnSp>
-        <p:nvCxnSpPr>
-          <p:cNvPr id="23" name="Straight Arrow Connector 22">
-            <a:extLst>
-              <a:ext uri="{FF2B5EF4-FFF2-40B4-BE49-F238E27FC236}">
-                <a16:creationId xmlns:a16="http://schemas.microsoft.com/office/drawing/2014/main" id="{7A109E8F-E423-4EEF-A2C0-7EBBD8C8E23C}"/>
-              </a:ext>
-            </a:extLst>
-          </p:cNvPr>
-          <p:cNvCxnSpPr>
-            <a:cxnSpLocks/>
-            <a:stCxn id="21" idx="0"/>
-            <a:endCxn id="12" idx="1"/>
-          </p:cNvCxnSpPr>
-          <p:nvPr/>
-        </p:nvCxnSpPr>
-        <p:spPr>
-          <a:xfrm flipV="1">
-            <a:off x="1822012" y="4207209"/>
-            <a:ext cx="1065435" cy="171537"/>
-          </a:xfrm>
-          <a:prstGeom prst="straightConnector1">
-            <a:avLst/>
-          </a:prstGeom>
-          <a:ln>
-            <a:tailEnd type="triangle"/>
-          </a:ln>
-        </p:spPr>
-        <p:style>
-          <a:lnRef idx="1">
-            <a:schemeClr val="dk1"/>
-          </a:lnRef>
-          <a:fillRef idx="0">
-            <a:schemeClr val="dk1"/>
-          </a:fillRef>
-          <a:effectRef idx="0">
-            <a:schemeClr val="dk1"/>
-          </a:effectRef>
-          <a:fontRef idx="minor">
-            <a:schemeClr val="tx1"/>
-          </a:fontRef>
-        </p:style>
-      </p:cxnSp>
-      <p:cxnSp>
-        <p:nvCxnSpPr>
-          <p:cNvPr id="24" name="Straight Arrow Connector 23">
-            <a:extLst>
-              <a:ext uri="{FF2B5EF4-FFF2-40B4-BE49-F238E27FC236}">
-                <a16:creationId xmlns:a16="http://schemas.microsoft.com/office/drawing/2014/main" id="{4283851E-9833-4740-9EAF-1D21B2D5C44C}"/>
-              </a:ext>
-            </a:extLst>
-          </p:cNvPr>
-          <p:cNvCxnSpPr>
-            <a:cxnSpLocks/>
-            <a:stCxn id="21" idx="6"/>
-            <a:endCxn id="13" idx="1"/>
-          </p:cNvCxnSpPr>
-          <p:nvPr/>
-        </p:nvCxnSpPr>
-        <p:spPr>
-          <a:xfrm>
-            <a:off x="1971120" y="4538929"/>
-            <a:ext cx="916327" cy="150273"/>
-          </a:xfrm>
-          <a:prstGeom prst="straightConnector1">
-            <a:avLst/>
-          </a:prstGeom>
-          <a:ln>
-            <a:tailEnd type="triangle"/>
-          </a:ln>
-        </p:spPr>
-        <p:style>
-          <a:lnRef idx="1">
-            <a:schemeClr val="dk1"/>
-          </a:lnRef>
-          <a:fillRef idx="0">
-            <a:schemeClr val="dk1"/>
-          </a:fillRef>
-          <a:effectRef idx="0">
-            <a:schemeClr val="dk1"/>
-          </a:effectRef>
-          <a:fontRef idx="minor">
-            <a:schemeClr val="tx1"/>
-          </a:fontRef>
-        </p:style>
-      </p:cxnSp>
-      <p:cxnSp>
-        <p:nvCxnSpPr>
-          <p:cNvPr id="33" name="Straight Arrow Connector 32">
-            <a:extLst>
-              <a:ext uri="{FF2B5EF4-FFF2-40B4-BE49-F238E27FC236}">
-                <a16:creationId xmlns:a16="http://schemas.microsoft.com/office/drawing/2014/main" id="{69AA3E06-D631-47AE-A798-5BD760943D4E}"/>
-              </a:ext>
-            </a:extLst>
-          </p:cNvPr>
-          <p:cNvCxnSpPr>
-            <a:cxnSpLocks/>
-            <a:stCxn id="21" idx="5"/>
-            <a:endCxn id="14" idx="1"/>
-          </p:cNvCxnSpPr>
-          <p:nvPr/>
-        </p:nvCxnSpPr>
-        <p:spPr>
-          <a:xfrm>
-            <a:off x="1927447" y="4652195"/>
-            <a:ext cx="957451" cy="468453"/>
-          </a:xfrm>
-          <a:prstGeom prst="straightConnector1">
-            <a:avLst/>
-          </a:prstGeom>
-          <a:ln>
-            <a:tailEnd type="triangle"/>
-          </a:ln>
-        </p:spPr>
-        <p:style>
-          <a:lnRef idx="1">
-            <a:schemeClr val="dk1"/>
-          </a:lnRef>
-          <a:fillRef idx="0">
-            <a:schemeClr val="dk1"/>
-          </a:fillRef>
-          <a:effectRef idx="0">
-            <a:schemeClr val="dk1"/>
-          </a:effectRef>
-          <a:fontRef idx="minor">
-            <a:schemeClr val="tx1"/>
-          </a:fontRef>
-        </p:style>
-      </p:cxnSp>
-      <p:sp>
-        <p:nvSpPr>
-          <p:cNvPr id="40" name="Oval 39">
-            <a:extLst>
-              <a:ext uri="{FF2B5EF4-FFF2-40B4-BE49-F238E27FC236}">
-                <a16:creationId xmlns:a16="http://schemas.microsoft.com/office/drawing/2014/main" id="{58328AC6-DAC5-4C9E-B1AC-71B7E6DB2636}"/>
-              </a:ext>
-            </a:extLst>
-          </p:cNvPr>
-          <p:cNvSpPr/>
-          <p:nvPr/>
-        </p:nvSpPr>
-        <p:spPr>
-          <a:xfrm>
-            <a:off x="2099623" y="5616996"/>
-            <a:ext cx="298217" cy="320365"/>
-          </a:xfrm>
-          <a:prstGeom prst="ellipse">
-            <a:avLst/>
-          </a:prstGeom>
-          <a:noFill/>
-          <a:ln>
-            <a:noFill/>
-          </a:ln>
-        </p:spPr>
-        <p:style>
-          <a:lnRef idx="2">
-            <a:schemeClr val="accent1">
-              <a:shade val="50000"/>
-            </a:schemeClr>
-          </a:lnRef>
-          <a:fillRef idx="1">
-            <a:schemeClr val="accent1"/>
-          </a:fillRef>
-          <a:effectRef idx="0">
-            <a:schemeClr val="accent1"/>
-          </a:effectRef>
-          <a:fontRef idx="minor">
-            <a:schemeClr val="lt1"/>
-          </a:fontRef>
-        </p:style>
-        <p:txBody>
-          <a:bodyPr rtlCol="0" anchor="ctr"/>
-          <a:lstStyle/>
-          <a:p>
-            <a:pPr marL="0" marR="0" lvl="0" indent="0" algn="ctr" defTabSz="457200" rtl="0" eaLnBrk="1" fontAlgn="auto" latinLnBrk="0" hangingPunct="1">
-              <a:lnSpc>
-                <a:spcPct val="100000"/>
-              </a:lnSpc>
-              <a:spcBef>
-                <a:spcPts val="0"/>
-              </a:spcBef>
-              <a:spcAft>
-                <a:spcPts val="0"/>
-              </a:spcAft>
-              <a:buClrTx/>
-              <a:buSzTx/>
-              <a:buFontTx/>
-              <a:buNone/>
-              <a:tabLst/>
-              <a:defRPr/>
-            </a:pPr>
-            <a:endParaRPr kumimoji="0" lang="en-GB" sz="1800" b="0" i="0" u="none" strike="noStrike" kern="1200" cap="none" spc="0" normalizeH="0" baseline="0" noProof="0">
-              <a:ln>
-                <a:noFill/>
-              </a:ln>
-              <a:solidFill>
-                <a:prstClr val="white"/>
-              </a:solidFill>
-              <a:effectLst/>
-              <a:uLnTx/>
-              <a:uFillTx/>
-              <a:latin typeface="Century Gothic" panose="020B0502020202020204"/>
-              <a:ea typeface="+mn-ea"/>
-              <a:cs typeface="+mn-cs"/>
-            </a:endParaRPr>
-          </a:p>
-        </p:txBody>
-      </p:sp>
-      <p:cxnSp>
-        <p:nvCxnSpPr>
-          <p:cNvPr id="41" name="Straight Arrow Connector 40">
-            <a:extLst>
-              <a:ext uri="{FF2B5EF4-FFF2-40B4-BE49-F238E27FC236}">
-                <a16:creationId xmlns:a16="http://schemas.microsoft.com/office/drawing/2014/main" id="{3CB25EEF-23BE-4F03-B57E-46078DFF74B4}"/>
-              </a:ext>
-            </a:extLst>
-          </p:cNvPr>
-          <p:cNvCxnSpPr>
-            <a:cxnSpLocks/>
-            <a:endCxn id="15" idx="1"/>
-          </p:cNvCxnSpPr>
-          <p:nvPr/>
-        </p:nvCxnSpPr>
-        <p:spPr>
-          <a:xfrm flipV="1">
-            <a:off x="2354167" y="5584217"/>
-            <a:ext cx="530731" cy="50964"/>
-          </a:xfrm>
-          <a:prstGeom prst="straightConnector1">
-            <a:avLst/>
-          </a:prstGeom>
-          <a:ln>
-            <a:tailEnd type="triangle"/>
-          </a:ln>
-        </p:spPr>
-        <p:style>
-          <a:lnRef idx="1">
-            <a:schemeClr val="dk1"/>
-          </a:lnRef>
-          <a:fillRef idx="0">
-            <a:schemeClr val="dk1"/>
-          </a:fillRef>
-          <a:effectRef idx="0">
-            <a:schemeClr val="dk1"/>
-          </a:effectRef>
-          <a:fontRef idx="minor">
-            <a:schemeClr val="tx1"/>
-          </a:fontRef>
-        </p:style>
-      </p:cxnSp>
-      <p:cxnSp>
-        <p:nvCxnSpPr>
-          <p:cNvPr id="42" name="Straight Arrow Connector 41">
-            <a:extLst>
-              <a:ext uri="{FF2B5EF4-FFF2-40B4-BE49-F238E27FC236}">
-                <a16:creationId xmlns:a16="http://schemas.microsoft.com/office/drawing/2014/main" id="{D1CA6919-134E-4DFC-AD9D-86FE735E5FD4}"/>
-              </a:ext>
-            </a:extLst>
-          </p:cNvPr>
-          <p:cNvCxnSpPr>
-            <a:cxnSpLocks/>
-            <a:stCxn id="40" idx="6"/>
-            <a:endCxn id="16" idx="1"/>
-          </p:cNvCxnSpPr>
-          <p:nvPr/>
-        </p:nvCxnSpPr>
-        <p:spPr>
-          <a:xfrm>
-            <a:off x="2397840" y="5777179"/>
-            <a:ext cx="487058" cy="234528"/>
-          </a:xfrm>
-          <a:prstGeom prst="straightConnector1">
-            <a:avLst/>
-          </a:prstGeom>
-          <a:ln>
-            <a:tailEnd type="triangle"/>
-          </a:ln>
-        </p:spPr>
-        <p:style>
-          <a:lnRef idx="1">
-            <a:schemeClr val="dk1"/>
-          </a:lnRef>
-          <a:fillRef idx="0">
-            <a:schemeClr val="dk1"/>
-          </a:fillRef>
-          <a:effectRef idx="0">
-            <a:schemeClr val="dk1"/>
-          </a:effectRef>
-          <a:fontRef idx="minor">
-            <a:schemeClr val="tx1"/>
-          </a:fontRef>
-        </p:style>
-      </p:cxnSp>
-      <p:cxnSp>
-        <p:nvCxnSpPr>
-          <p:cNvPr id="43" name="Straight Arrow Connector 42">
-            <a:extLst>
-              <a:ext uri="{FF2B5EF4-FFF2-40B4-BE49-F238E27FC236}">
-                <a16:creationId xmlns:a16="http://schemas.microsoft.com/office/drawing/2014/main" id="{E81A32A2-9430-4C6E-A882-C521DA5988E9}"/>
-              </a:ext>
-            </a:extLst>
-          </p:cNvPr>
-          <p:cNvCxnSpPr>
-            <a:cxnSpLocks/>
-            <a:stCxn id="40" idx="5"/>
-            <a:endCxn id="17" idx="1"/>
-          </p:cNvCxnSpPr>
-          <p:nvPr/>
-        </p:nvCxnSpPr>
-        <p:spPr>
-          <a:xfrm>
-            <a:off x="2354167" y="5890445"/>
-            <a:ext cx="503479" cy="545380"/>
-          </a:xfrm>
-          <a:prstGeom prst="straightConnector1">
-            <a:avLst/>
-          </a:prstGeom>
-          <a:ln>
-            <a:tailEnd type="triangle"/>
-          </a:ln>
-        </p:spPr>
-        <p:style>
-          <a:lnRef idx="1">
-            <a:schemeClr val="dk1"/>
-          </a:lnRef>
-          <a:fillRef idx="0">
-            <a:schemeClr val="dk1"/>
-          </a:fillRef>
-          <a:effectRef idx="0">
-            <a:schemeClr val="dk1"/>
-          </a:effectRef>
-          <a:fontRef idx="minor">
-            <a:schemeClr val="tx1"/>
-          </a:fontRef>
-        </p:style>
-      </p:cxnSp>
-    </p:spTree>
-    <p:extLst>
-      <p:ext uri="{BB962C8B-B14F-4D97-AF65-F5344CB8AC3E}">
-        <p14:creationId xmlns:p14="http://schemas.microsoft.com/office/powerpoint/2010/main" val="769264280"/>
-      </p:ext>
-    </p:extLst>
-  </p:cSld>
-  <p:clrMapOvr>
-    <a:masterClrMapping/>
-  </p:clrMapOvr>
-</p:sld>
-</file>
-
 <file path=ppt/slides/slide2.xml><?xml version="1.0" encoding="utf-8"?>
 <p:sld xmlns:a="http://schemas.openxmlformats.org/drawingml/2006/main" xmlns:r="http://schemas.openxmlformats.org/officeDocument/2006/relationships" xmlns:p="http://schemas.openxmlformats.org/presentationml/2006/main">
   <p:cSld>
@@ -34905,7 +33431,9 @@
           </a:fontRef>
         </p:style>
         <p:txBody>
-          <a:bodyPr/>
+          <a:bodyPr vert="horz" lIns="91440" tIns="45720" rIns="91440" bIns="45720" rtlCol="0" anchor="t">
+            <a:normAutofit/>
+          </a:bodyPr>
           <a:lstStyle/>
           <a:p>
             <a:r>
@@ -34921,7 +33449,7 @@
                   </a:extLst>
                 </a:hlinkClick>
               </a:rPr>
-              <a:t>Go to slide 33</a:t>
+              <a:t>Go to slide 7</a:t>
             </a:r>
             <a:endParaRPr lang="en-GB" dirty="0">
               <a:solidFill>
@@ -35415,7 +33943,7 @@
           </a:fontRef>
         </p:style>
         <p:txBody>
-          <a:bodyPr vert="horz" lIns="91440" tIns="45720" rIns="91440" bIns="45720" rtlCol="0">
+          <a:bodyPr vert="horz" lIns="91440" tIns="45720" rIns="91440" bIns="45720" rtlCol="0" anchor="t">
             <a:normAutofit/>
           </a:bodyPr>
           <a:lstStyle>
@@ -35660,7 +34188,23 @@
                   </a:extLst>
                 </a:hlinkClick>
               </a:rPr>
-              <a:t>Go to slide 32</a:t>
+              <a:t>Go to slide </a:t>
+            </a:r>
+            <a:r>
+              <a:rPr lang="en-GB" dirty="0">
+                <a:solidFill>
+                  <a:srgbClr val="0E5580"/>
+                </a:solidFill>
+                <a:latin typeface="Century Gothic" panose="020B0502020202020204"/>
+                <a:hlinkClick r:id="rId4" action="ppaction://hlinksldjump">
+                  <a:extLst>
+                    <a:ext uri="{A12FA001-AC4F-418D-AE19-62706E023703}">
+                      <ahyp:hlinkClr xmlns:ahyp="http://schemas.microsoft.com/office/drawing/2018/hyperlinkcolor" val="tx"/>
+                    </a:ext>
+                  </a:extLst>
+                </a:hlinkClick>
+              </a:rPr>
+              <a:t>6</a:t>
             </a:r>
             <a:endParaRPr kumimoji="0" lang="en-GB" sz="1800" b="0" i="0" u="none" strike="noStrike" kern="1200" cap="none" spc="0" normalizeH="0" baseline="0" noProof="0" dirty="0">
               <a:ln>
@@ -39246,7 +37790,9 @@
           </a:fontRef>
         </p:style>
         <p:txBody>
-          <a:bodyPr/>
+          <a:bodyPr vert="horz" lIns="91440" tIns="45720" rIns="91440" bIns="45720" rtlCol="0" anchor="t">
+            <a:normAutofit/>
+          </a:bodyPr>
           <a:lstStyle/>
           <a:p>
             <a:r>
@@ -39262,7 +37808,7 @@
                   </a:extLst>
                 </a:hlinkClick>
               </a:rPr>
-              <a:t>Go to slide 36</a:t>
+              <a:t>Go to slide 10</a:t>
             </a:r>
             <a:endParaRPr lang="en-GB" dirty="0">
               <a:solidFill>
@@ -39756,7 +38302,7 @@
           </a:fontRef>
         </p:style>
         <p:txBody>
-          <a:bodyPr vert="horz" lIns="91440" tIns="45720" rIns="91440" bIns="45720" rtlCol="0">
+          <a:bodyPr vert="horz" lIns="91440" tIns="45720" rIns="91440" bIns="45720" rtlCol="0" anchor="t">
             <a:normAutofit/>
           </a:bodyPr>
           <a:lstStyle>
@@ -40001,7 +38547,23 @@
                   </a:extLst>
                 </a:hlinkClick>
               </a:rPr>
-              <a:t>Go to slide 35</a:t>
+              <a:t>Go to slide </a:t>
+            </a:r>
+            <a:r>
+              <a:rPr lang="en-GB" dirty="0">
+                <a:solidFill>
+                  <a:srgbClr val="0E5580"/>
+                </a:solidFill>
+                <a:latin typeface="Century Gothic" panose="020B0502020202020204"/>
+                <a:hlinkClick r:id="rId3" action="ppaction://hlinksldjump">
+                  <a:extLst>
+                    <a:ext uri="{A12FA001-AC4F-418D-AE19-62706E023703}">
+                      <ahyp:hlinkClr xmlns:ahyp="http://schemas.microsoft.com/office/drawing/2018/hyperlinkcolor" val="tx"/>
+                    </a:ext>
+                  </a:extLst>
+                </a:hlinkClick>
+              </a:rPr>
+              <a:t>9</a:t>
             </a:r>
             <a:endParaRPr kumimoji="0" lang="en-GB" sz="1800" b="0" i="0" u="none" strike="noStrike" kern="1200" cap="none" spc="0" normalizeH="0" baseline="0" noProof="0" dirty="0">
               <a:ln>

</xml_diff>

<commit_message>
Try push again after build
</commit_message>
<xml_diff>
--- a/docs/slides/S3_General_Intro.pptx
+++ b/docs/slides/S3_General_Intro.pptx
@@ -161,11 +161,26 @@
 <pc:chgInfo xmlns:a="http://schemas.openxmlformats.org/drawingml/2006/main" xmlns:r="http://schemas.openxmlformats.org/officeDocument/2006/relationships" xmlns:ac="http://schemas.microsoft.com/office/drawing/2013/main/command" xmlns:pc="http://schemas.microsoft.com/office/powerpoint/2013/main/command">
   <pc:docChgLst>
     <pc:chgData name="Liam Hill" userId="cf4eacb2-5eb2-4c8d-8100-2f2500eca56b" providerId="ADAL" clId="{A08C5B63-297E-4833-9037-A856AABE64B4}"/>
-    <pc:docChg chg="delSld delSection modSection">
-      <pc:chgData name="Liam Hill" userId="cf4eacb2-5eb2-4c8d-8100-2f2500eca56b" providerId="ADAL" clId="{A08C5B63-297E-4833-9037-A856AABE64B4}" dt="2025-06-13T16:13:30.546" v="4" actId="17851"/>
+    <pc:docChg chg="delSld modSld delSection modSection">
+      <pc:chgData name="Liam Hill" userId="cf4eacb2-5eb2-4c8d-8100-2f2500eca56b" providerId="ADAL" clId="{A08C5B63-297E-4833-9037-A856AABE64B4}" dt="2025-06-13T16:25:51.078" v="5" actId="6549"/>
       <pc:docMkLst>
         <pc:docMk/>
       </pc:docMkLst>
+      <pc:sldChg chg="modSp mod">
+        <pc:chgData name="Liam Hill" userId="cf4eacb2-5eb2-4c8d-8100-2f2500eca56b" providerId="ADAL" clId="{A08C5B63-297E-4833-9037-A856AABE64B4}" dt="2025-06-13T16:25:51.078" v="5" actId="6549"/>
+        <pc:sldMkLst>
+          <pc:docMk/>
+          <pc:sldMk cId="501211901" sldId="256"/>
+        </pc:sldMkLst>
+        <pc:spChg chg="mod">
+          <ac:chgData name="Liam Hill" userId="cf4eacb2-5eb2-4c8d-8100-2f2500eca56b" providerId="ADAL" clId="{A08C5B63-297E-4833-9037-A856AABE64B4}" dt="2025-06-13T16:25:51.078" v="5" actId="6549"/>
+          <ac:spMkLst>
+            <pc:docMk/>
+            <pc:sldMk cId="501211901" sldId="256"/>
+            <ac:spMk id="2" creationId="{00000000-0000-0000-0000-000000000000}"/>
+          </ac:spMkLst>
+        </pc:spChg>
+      </pc:sldChg>
       <pc:sldChg chg="del">
         <pc:chgData name="Liam Hill" userId="cf4eacb2-5eb2-4c8d-8100-2f2500eca56b" providerId="ADAL" clId="{A08C5B63-297E-4833-9037-A856AABE64B4}" dt="2025-06-13T16:13:10.430" v="0" actId="47"/>
         <pc:sldMkLst>
@@ -27395,14 +27410,15 @@
               <a:t>An introduction to inferential statistical tests</a:t>
             </a:r>
             <a:br>
-              <a:rPr lang="en-GB" dirty="0"/>
-            </a:br>
-            <a:br>
-              <a:rPr lang="en-GB" dirty="0"/>
+              <a:rPr lang="en-GB"/>
             </a:br>
             <a:r>
+              <a:rPr lang="en-GB" sz="2200" i="1"/>
+              <a:t>CAP </a:t>
+            </a:r>
+            <a:r>
               <a:rPr lang="en-GB" sz="2200" i="1" dirty="0"/>
-              <a:t>CAP Pathway: Intro to Statistics</a:t>
+              <a:t>Pathway: Intro to Statistics</a:t>
             </a:r>
             <a:br>
               <a:rPr lang="en-GB" sz="3600" dirty="0"/>

</xml_diff>